<commit_message>
added ir tessel tip
</commit_message>
<xml_diff>
--- a/JavaScript-vs-Skynet.pptx
+++ b/JavaScript-vs-Skynet.pptx
@@ -1312,8 +1312,30 @@
             </a:r>
             <a:r>
               <a:rPr lang="en-US" baseline="0" dirty="0" smtClean="0"/>
-              <a:t> (fun)</a:t>
-            </a:r>
+              <a:t> (fun</a:t>
+            </a:r>
+            <a:r>
+              <a:rPr lang="en-US" baseline="0" dirty="0" smtClean="0"/>
+              <a:t>)</a:t>
+            </a:r>
+          </a:p>
+          <a:p>
+            <a:endParaRPr lang="en-US" baseline="0" dirty="0" smtClean="0"/>
+          </a:p>
+          <a:p>
+            <a:r>
+              <a:rPr lang="en-US" baseline="0" dirty="0" err="1" smtClean="0"/>
+              <a:t>Tessel</a:t>
+            </a:r>
+            <a:r>
+              <a:rPr lang="en-US" baseline="0" dirty="0" smtClean="0"/>
+              <a:t> command should be run from the </a:t>
+            </a:r>
+            <a:r>
+              <a:rPr lang="en-US" baseline="0" smtClean="0"/>
+              <a:t>appropriate directory</a:t>
+            </a:r>
+            <a:endParaRPr lang="en-US" baseline="0" dirty="0" smtClean="0"/>
           </a:p>
           <a:p>
             <a:r>

</xml_diff>

<commit_message>
regan servo added drone nav slide change
</commit_message>
<xml_diff>
--- a/JavaScript-vs-Skynet.pptx
+++ b/JavaScript-vs-Skynet.pptx
@@ -1329,11 +1329,7 @@
             </a:r>
             <a:r>
               <a:rPr lang="en-US" baseline="0" dirty="0" smtClean="0"/>
-              <a:t> command should be run from the </a:t>
-            </a:r>
-            <a:r>
-              <a:rPr lang="en-US" baseline="0" smtClean="0"/>
-              <a:t>appropriate directory</a:t>
+              <a:t> command should be run from the appropriate directory</a:t>
             </a:r>
             <a:endParaRPr lang="en-US" baseline="0" dirty="0" smtClean="0"/>
           </a:p>
@@ -1439,19 +1435,56 @@
             </a:r>
             <a:r>
               <a:rPr lang="en-US" baseline="0" dirty="0" smtClean="0"/>
-              <a:t> board</a:t>
-            </a:r>
+              <a:t> </a:t>
+            </a:r>
+            <a:r>
+              <a:rPr lang="en-US" baseline="0" dirty="0" smtClean="0"/>
+              <a:t>board</a:t>
+            </a:r>
+          </a:p>
+          <a:p>
+            <a:endParaRPr lang="en-US" baseline="0" dirty="0" smtClean="0"/>
           </a:p>
           <a:p>
             <a:r>
               <a:rPr lang="en-US" baseline="0" dirty="0" err="1" smtClean="0"/>
-              <a:t>Xbee</a:t>
+              <a:t>Pinoccio</a:t>
             </a:r>
             <a:r>
               <a:rPr lang="en-US" baseline="0" dirty="0" smtClean="0"/>
-              <a:t> - </a:t>
-            </a:r>
-            <a:endParaRPr lang="en-US" dirty="0"/>
+              <a:t> -  for building FULLY wireless projects that are connected to the web</a:t>
+            </a:r>
+          </a:p>
+          <a:p>
+            <a:r>
+              <a:rPr lang="en-US" baseline="0" dirty="0" smtClean="0"/>
+              <a:t>	Backpacks are their shields</a:t>
+            </a:r>
+          </a:p>
+          <a:p>
+            <a:r>
+              <a:rPr lang="en-US" baseline="0" dirty="0" smtClean="0"/>
+              <a:t>	Scout is the heart and soul</a:t>
+            </a:r>
+          </a:p>
+          <a:p>
+            <a:r>
+              <a:rPr lang="en-US" baseline="0" dirty="0" smtClean="0"/>
+              <a:t>	Communicates via </a:t>
+            </a:r>
+            <a:r>
+              <a:rPr lang="en-US" baseline="0" dirty="0" err="1" smtClean="0"/>
+              <a:t>wifi</a:t>
+            </a:r>
+            <a:r>
+              <a:rPr lang="en-US" baseline="0" dirty="0" smtClean="0"/>
+              <a:t> and radio to create </a:t>
+            </a:r>
+            <a:r>
+              <a:rPr lang="en-US" baseline="0" smtClean="0"/>
+              <a:t>a mesh</a:t>
+            </a:r>
+            <a:endParaRPr lang="en-US" baseline="0" dirty="0" smtClean="0"/>
           </a:p>
         </p:txBody>
       </p:sp>
@@ -6754,7 +6787,226 @@
   <p:timing>
     <p:tnLst>
       <p:par>
-        <p:cTn xmlns:p14="http://schemas.microsoft.com/office/powerpoint/2010/main" id="1" dur="indefinite" restart="never" nodeType="tmRoot"/>
+        <p:cTn xmlns:p14="http://schemas.microsoft.com/office/powerpoint/2010/main" id="1" dur="indefinite" restart="never" nodeType="tmRoot">
+          <p:childTnLst>
+            <p:seq concurrent="1" nextAc="seek">
+              <p:cTn id="2" dur="indefinite" nodeType="mainSeq">
+                <p:childTnLst>
+                  <p:par>
+                    <p:cTn id="3" fill="hold">
+                      <p:stCondLst>
+                        <p:cond delay="indefinite"/>
+                      </p:stCondLst>
+                      <p:childTnLst>
+                        <p:par>
+                          <p:cTn id="4" fill="hold">
+                            <p:stCondLst>
+                              <p:cond delay="0"/>
+                            </p:stCondLst>
+                            <p:childTnLst>
+                              <p:par>
+                                <p:cTn id="5" presetID="1" presetClass="entr" presetSubtype="0" fill="hold" nodeType="clickEffect">
+                                  <p:stCondLst>
+                                    <p:cond delay="0"/>
+                                  </p:stCondLst>
+                                  <p:childTnLst>
+                                    <p:set>
+                                      <p:cBhvr>
+                                        <p:cTn id="6" dur="1" fill="hold">
+                                          <p:stCondLst>
+                                            <p:cond delay="0"/>
+                                          </p:stCondLst>
+                                        </p:cTn>
+                                        <p:tgtEl>
+                                          <p:spTgt spid="3">
+                                            <p:txEl>
+                                              <p:pRg st="0" end="0"/>
+                                            </p:txEl>
+                                          </p:spTgt>
+                                        </p:tgtEl>
+                                        <p:attrNameLst>
+                                          <p:attrName>style.visibility</p:attrName>
+                                        </p:attrNameLst>
+                                      </p:cBhvr>
+                                      <p:to>
+                                        <p:strVal val="visible"/>
+                                      </p:to>
+                                    </p:set>
+                                  </p:childTnLst>
+                                </p:cTn>
+                              </p:par>
+                            </p:childTnLst>
+                          </p:cTn>
+                        </p:par>
+                      </p:childTnLst>
+                    </p:cTn>
+                  </p:par>
+                  <p:par>
+                    <p:cTn id="7" fill="hold">
+                      <p:stCondLst>
+                        <p:cond delay="indefinite"/>
+                      </p:stCondLst>
+                      <p:childTnLst>
+                        <p:par>
+                          <p:cTn id="8" fill="hold">
+                            <p:stCondLst>
+                              <p:cond delay="0"/>
+                            </p:stCondLst>
+                            <p:childTnLst>
+                              <p:par>
+                                <p:cTn id="9" presetID="1" presetClass="entr" presetSubtype="0" fill="hold" nodeType="clickEffect">
+                                  <p:stCondLst>
+                                    <p:cond delay="0"/>
+                                  </p:stCondLst>
+                                  <p:childTnLst>
+                                    <p:set>
+                                      <p:cBhvr>
+                                        <p:cTn id="10" dur="1" fill="hold">
+                                          <p:stCondLst>
+                                            <p:cond delay="0"/>
+                                          </p:stCondLst>
+                                        </p:cTn>
+                                        <p:tgtEl>
+                                          <p:spTgt spid="3">
+                                            <p:txEl>
+                                              <p:pRg st="1" end="1"/>
+                                            </p:txEl>
+                                          </p:spTgt>
+                                        </p:tgtEl>
+                                        <p:attrNameLst>
+                                          <p:attrName>style.visibility</p:attrName>
+                                        </p:attrNameLst>
+                                      </p:cBhvr>
+                                      <p:to>
+                                        <p:strVal val="visible"/>
+                                      </p:to>
+                                    </p:set>
+                                  </p:childTnLst>
+                                </p:cTn>
+                              </p:par>
+                            </p:childTnLst>
+                          </p:cTn>
+                        </p:par>
+                      </p:childTnLst>
+                    </p:cTn>
+                  </p:par>
+                  <p:par>
+                    <p:cTn id="11" fill="hold">
+                      <p:stCondLst>
+                        <p:cond delay="indefinite"/>
+                      </p:stCondLst>
+                      <p:childTnLst>
+                        <p:par>
+                          <p:cTn id="12" fill="hold">
+                            <p:stCondLst>
+                              <p:cond delay="0"/>
+                            </p:stCondLst>
+                            <p:childTnLst>
+                              <p:par>
+                                <p:cTn id="13" presetID="1" presetClass="entr" presetSubtype="0" fill="hold" nodeType="clickEffect">
+                                  <p:stCondLst>
+                                    <p:cond delay="0"/>
+                                  </p:stCondLst>
+                                  <p:childTnLst>
+                                    <p:set>
+                                      <p:cBhvr>
+                                        <p:cTn id="14" dur="1" fill="hold">
+                                          <p:stCondLst>
+                                            <p:cond delay="0"/>
+                                          </p:stCondLst>
+                                        </p:cTn>
+                                        <p:tgtEl>
+                                          <p:spTgt spid="3">
+                                            <p:txEl>
+                                              <p:pRg st="2" end="2"/>
+                                            </p:txEl>
+                                          </p:spTgt>
+                                        </p:tgtEl>
+                                        <p:attrNameLst>
+                                          <p:attrName>style.visibility</p:attrName>
+                                        </p:attrNameLst>
+                                      </p:cBhvr>
+                                      <p:to>
+                                        <p:strVal val="visible"/>
+                                      </p:to>
+                                    </p:set>
+                                  </p:childTnLst>
+                                </p:cTn>
+                              </p:par>
+                            </p:childTnLst>
+                          </p:cTn>
+                        </p:par>
+                      </p:childTnLst>
+                    </p:cTn>
+                  </p:par>
+                  <p:par>
+                    <p:cTn id="15" fill="hold">
+                      <p:stCondLst>
+                        <p:cond delay="indefinite"/>
+                      </p:stCondLst>
+                      <p:childTnLst>
+                        <p:par>
+                          <p:cTn id="16" fill="hold">
+                            <p:stCondLst>
+                              <p:cond delay="0"/>
+                            </p:stCondLst>
+                            <p:childTnLst>
+                              <p:par>
+                                <p:cTn id="17" presetID="1" presetClass="entr" presetSubtype="0" fill="hold" nodeType="clickEffect">
+                                  <p:stCondLst>
+                                    <p:cond delay="0"/>
+                                  </p:stCondLst>
+                                  <p:childTnLst>
+                                    <p:set>
+                                      <p:cBhvr>
+                                        <p:cTn id="18" dur="1" fill="hold">
+                                          <p:stCondLst>
+                                            <p:cond delay="0"/>
+                                          </p:stCondLst>
+                                        </p:cTn>
+                                        <p:tgtEl>
+                                          <p:spTgt spid="3">
+                                            <p:txEl>
+                                              <p:pRg st="3" end="3"/>
+                                            </p:txEl>
+                                          </p:spTgt>
+                                        </p:tgtEl>
+                                        <p:attrNameLst>
+                                          <p:attrName>style.visibility</p:attrName>
+                                        </p:attrNameLst>
+                                      </p:cBhvr>
+                                      <p:to>
+                                        <p:strVal val="visible"/>
+                                      </p:to>
+                                    </p:set>
+                                  </p:childTnLst>
+                                </p:cTn>
+                              </p:par>
+                            </p:childTnLst>
+                          </p:cTn>
+                        </p:par>
+                      </p:childTnLst>
+                    </p:cTn>
+                  </p:par>
+                </p:childTnLst>
+              </p:cTn>
+              <p:prevCondLst>
+                <p:cond evt="onPrev" delay="0">
+                  <p:tgtEl>
+                    <p:sldTgt/>
+                  </p:tgtEl>
+                </p:cond>
+              </p:prevCondLst>
+              <p:nextCondLst>
+                <p:cond evt="onNext" delay="0">
+                  <p:tgtEl>
+                    <p:sldTgt/>
+                  </p:tgtEl>
+                </p:cond>
+              </p:nextCondLst>
+            </p:seq>
+          </p:childTnLst>
+        </p:cTn>
       </p:par>
     </p:tnLst>
   </p:timing>
@@ -6814,14 +7066,15 @@
         <p:spPr/>
         <p:txBody>
           <a:bodyPr>
-            <a:normAutofit fontScale="77500" lnSpcReduction="20000"/>
+            <a:normAutofit lnSpcReduction="10000"/>
           </a:bodyPr>
           <a:lstStyle/>
           <a:p>
             <a:r>
               <a:rPr lang="en-US" dirty="0" smtClean="0"/>
-              <a:t>Microcontrollers</a:t>
-            </a:r>
+              <a:t>Microcontrollers and Microprocessors</a:t>
+            </a:r>
+            <a:endParaRPr lang="en-US" dirty="0" smtClean="0"/>
           </a:p>
           <a:p>
             <a:pPr lvl="1"/>
@@ -6871,12 +7124,6 @@
             <a:endParaRPr lang="en-US" dirty="0" smtClean="0"/>
           </a:p>
           <a:p>
-            <a:r>
-              <a:rPr lang="en-US" dirty="0" smtClean="0"/>
-              <a:t>Microprocessors</a:t>
-            </a:r>
-          </a:p>
-          <a:p>
             <a:pPr lvl="1"/>
             <a:r>
               <a:rPr lang="en-US" dirty="0" err="1" smtClean="0"/>
@@ -6891,12 +7138,6 @@
               <a:t>Beagleboard</a:t>
             </a:r>
             <a:endParaRPr lang="en-US" dirty="0" smtClean="0"/>
-          </a:p>
-          <a:p>
-            <a:r>
-              <a:rPr lang="en-US" dirty="0" smtClean="0"/>
-              <a:t>In the middle</a:t>
-            </a:r>
           </a:p>
           <a:p>
             <a:pPr lvl="1"/>
@@ -8379,6 +8620,1317 @@
     <p:extLst>
       <p:ext uri="{BB962C8B-B14F-4D97-AF65-F5344CB8AC3E}">
         <p14:creationId xmlns:p14="http://schemas.microsoft.com/office/powerpoint/2010/main" val="2339918173"/>
+      </p:ext>
+    </p:extLst>
+  </p:cSld>
+  <p:clrMapOvr>
+    <a:masterClrMapping/>
+  </p:clrMapOvr>
+  <p:timing>
+    <p:tnLst>
+      <p:par>
+        <p:cTn xmlns:p14="http://schemas.microsoft.com/office/powerpoint/2010/main" id="1" dur="indefinite" restart="never" nodeType="tmRoot">
+          <p:childTnLst>
+            <p:seq concurrent="1" nextAc="seek">
+              <p:cTn id="2" dur="indefinite" nodeType="mainSeq">
+                <p:childTnLst>
+                  <p:par>
+                    <p:cTn id="3" fill="hold">
+                      <p:stCondLst>
+                        <p:cond delay="indefinite"/>
+                      </p:stCondLst>
+                      <p:childTnLst>
+                        <p:par>
+                          <p:cTn id="4" fill="hold">
+                            <p:stCondLst>
+                              <p:cond delay="0"/>
+                            </p:stCondLst>
+                            <p:childTnLst>
+                              <p:par>
+                                <p:cTn id="5" presetID="1" presetClass="entr" presetSubtype="0" fill="hold" nodeType="clickEffect">
+                                  <p:stCondLst>
+                                    <p:cond delay="0"/>
+                                  </p:stCondLst>
+                                  <p:childTnLst>
+                                    <p:set>
+                                      <p:cBhvr>
+                                        <p:cTn id="6" dur="1" fill="hold">
+                                          <p:stCondLst>
+                                            <p:cond delay="0"/>
+                                          </p:stCondLst>
+                                        </p:cTn>
+                                        <p:tgtEl>
+                                          <p:spTgt spid="3">
+                                            <p:txEl>
+                                              <p:pRg st="1" end="1"/>
+                                            </p:txEl>
+                                          </p:spTgt>
+                                        </p:tgtEl>
+                                        <p:attrNameLst>
+                                          <p:attrName>style.visibility</p:attrName>
+                                        </p:attrNameLst>
+                                      </p:cBhvr>
+                                      <p:to>
+                                        <p:strVal val="visible"/>
+                                      </p:to>
+                                    </p:set>
+                                  </p:childTnLst>
+                                </p:cTn>
+                              </p:par>
+                            </p:childTnLst>
+                          </p:cTn>
+                        </p:par>
+                      </p:childTnLst>
+                    </p:cTn>
+                  </p:par>
+                  <p:par>
+                    <p:cTn id="7" fill="hold">
+                      <p:stCondLst>
+                        <p:cond delay="indefinite"/>
+                      </p:stCondLst>
+                      <p:childTnLst>
+                        <p:par>
+                          <p:cTn id="8" fill="hold">
+                            <p:stCondLst>
+                              <p:cond delay="0"/>
+                            </p:stCondLst>
+                            <p:childTnLst>
+                              <p:par>
+                                <p:cTn id="9" presetID="1" presetClass="entr" presetSubtype="0" fill="hold" nodeType="clickEffect">
+                                  <p:stCondLst>
+                                    <p:cond delay="0"/>
+                                  </p:stCondLst>
+                                  <p:childTnLst>
+                                    <p:set>
+                                      <p:cBhvr>
+                                        <p:cTn id="10" dur="1" fill="hold">
+                                          <p:stCondLst>
+                                            <p:cond delay="0"/>
+                                          </p:stCondLst>
+                                        </p:cTn>
+                                        <p:tgtEl>
+                                          <p:spTgt spid="3">
+                                            <p:txEl>
+                                              <p:pRg st="2" end="2"/>
+                                            </p:txEl>
+                                          </p:spTgt>
+                                        </p:tgtEl>
+                                        <p:attrNameLst>
+                                          <p:attrName>style.visibility</p:attrName>
+                                        </p:attrNameLst>
+                                      </p:cBhvr>
+                                      <p:to>
+                                        <p:strVal val="visible"/>
+                                      </p:to>
+                                    </p:set>
+                                  </p:childTnLst>
+                                </p:cTn>
+                              </p:par>
+                            </p:childTnLst>
+                          </p:cTn>
+                        </p:par>
+                      </p:childTnLst>
+                    </p:cTn>
+                  </p:par>
+                  <p:par>
+                    <p:cTn id="11" fill="hold">
+                      <p:stCondLst>
+                        <p:cond delay="indefinite"/>
+                      </p:stCondLst>
+                      <p:childTnLst>
+                        <p:par>
+                          <p:cTn id="12" fill="hold">
+                            <p:stCondLst>
+                              <p:cond delay="0"/>
+                            </p:stCondLst>
+                            <p:childTnLst>
+                              <p:par>
+                                <p:cTn id="13" presetID="1" presetClass="entr" presetSubtype="0" fill="hold" nodeType="clickEffect">
+                                  <p:stCondLst>
+                                    <p:cond delay="0"/>
+                                  </p:stCondLst>
+                                  <p:childTnLst>
+                                    <p:set>
+                                      <p:cBhvr>
+                                        <p:cTn id="14" dur="1" fill="hold">
+                                          <p:stCondLst>
+                                            <p:cond delay="0"/>
+                                          </p:stCondLst>
+                                        </p:cTn>
+                                        <p:tgtEl>
+                                          <p:spTgt spid="3">
+                                            <p:txEl>
+                                              <p:pRg st="3" end="3"/>
+                                            </p:txEl>
+                                          </p:spTgt>
+                                        </p:tgtEl>
+                                        <p:attrNameLst>
+                                          <p:attrName>style.visibility</p:attrName>
+                                        </p:attrNameLst>
+                                      </p:cBhvr>
+                                      <p:to>
+                                        <p:strVal val="visible"/>
+                                      </p:to>
+                                    </p:set>
+                                  </p:childTnLst>
+                                </p:cTn>
+                              </p:par>
+                            </p:childTnLst>
+                          </p:cTn>
+                        </p:par>
+                      </p:childTnLst>
+                    </p:cTn>
+                  </p:par>
+                  <p:par>
+                    <p:cTn id="15" fill="hold">
+                      <p:stCondLst>
+                        <p:cond delay="indefinite"/>
+                      </p:stCondLst>
+                      <p:childTnLst>
+                        <p:par>
+                          <p:cTn id="16" fill="hold">
+                            <p:stCondLst>
+                              <p:cond delay="0"/>
+                            </p:stCondLst>
+                            <p:childTnLst>
+                              <p:par>
+                                <p:cTn id="17" presetID="1" presetClass="entr" presetSubtype="0" fill="hold" nodeType="clickEffect">
+                                  <p:stCondLst>
+                                    <p:cond delay="0"/>
+                                  </p:stCondLst>
+                                  <p:childTnLst>
+                                    <p:set>
+                                      <p:cBhvr>
+                                        <p:cTn id="18" dur="1" fill="hold">
+                                          <p:stCondLst>
+                                            <p:cond delay="0"/>
+                                          </p:stCondLst>
+                                        </p:cTn>
+                                        <p:tgtEl>
+                                          <p:spTgt spid="3">
+                                            <p:txEl>
+                                              <p:pRg st="4" end="4"/>
+                                            </p:txEl>
+                                          </p:spTgt>
+                                        </p:tgtEl>
+                                        <p:attrNameLst>
+                                          <p:attrName>style.visibility</p:attrName>
+                                        </p:attrNameLst>
+                                      </p:cBhvr>
+                                      <p:to>
+                                        <p:strVal val="visible"/>
+                                      </p:to>
+                                    </p:set>
+                                  </p:childTnLst>
+                                </p:cTn>
+                              </p:par>
+                            </p:childTnLst>
+                          </p:cTn>
+                        </p:par>
+                      </p:childTnLst>
+                    </p:cTn>
+                  </p:par>
+                  <p:par>
+                    <p:cTn id="19" fill="hold">
+                      <p:stCondLst>
+                        <p:cond delay="indefinite"/>
+                      </p:stCondLst>
+                      <p:childTnLst>
+                        <p:par>
+                          <p:cTn id="20" fill="hold">
+                            <p:stCondLst>
+                              <p:cond delay="0"/>
+                            </p:stCondLst>
+                            <p:childTnLst>
+                              <p:par>
+                                <p:cTn id="21" presetID="1" presetClass="entr" presetSubtype="0" fill="hold" nodeType="clickEffect">
+                                  <p:stCondLst>
+                                    <p:cond delay="0"/>
+                                  </p:stCondLst>
+                                  <p:childTnLst>
+                                    <p:set>
+                                      <p:cBhvr>
+                                        <p:cTn id="22" dur="1" fill="hold">
+                                          <p:stCondLst>
+                                            <p:cond delay="0"/>
+                                          </p:stCondLst>
+                                        </p:cTn>
+                                        <p:tgtEl>
+                                          <p:spTgt spid="3">
+                                            <p:txEl>
+                                              <p:pRg st="5" end="5"/>
+                                            </p:txEl>
+                                          </p:spTgt>
+                                        </p:tgtEl>
+                                        <p:attrNameLst>
+                                          <p:attrName>style.visibility</p:attrName>
+                                        </p:attrNameLst>
+                                      </p:cBhvr>
+                                      <p:to>
+                                        <p:strVal val="visible"/>
+                                      </p:to>
+                                    </p:set>
+                                  </p:childTnLst>
+                                </p:cTn>
+                              </p:par>
+                            </p:childTnLst>
+                          </p:cTn>
+                        </p:par>
+                      </p:childTnLst>
+                    </p:cTn>
+                  </p:par>
+                  <p:par>
+                    <p:cTn id="23" fill="hold">
+                      <p:stCondLst>
+                        <p:cond delay="indefinite"/>
+                      </p:stCondLst>
+                      <p:childTnLst>
+                        <p:par>
+                          <p:cTn id="24" fill="hold">
+                            <p:stCondLst>
+                              <p:cond delay="0"/>
+                            </p:stCondLst>
+                            <p:childTnLst>
+                              <p:par>
+                                <p:cTn id="25" presetID="1" presetClass="entr" presetSubtype="0" fill="hold" nodeType="clickEffect">
+                                  <p:stCondLst>
+                                    <p:cond delay="0"/>
+                                  </p:stCondLst>
+                                  <p:childTnLst>
+                                    <p:set>
+                                      <p:cBhvr>
+                                        <p:cTn id="26" dur="1" fill="hold">
+                                          <p:stCondLst>
+                                            <p:cond delay="0"/>
+                                          </p:stCondLst>
+                                        </p:cTn>
+                                        <p:tgtEl>
+                                          <p:spTgt spid="3">
+                                            <p:txEl>
+                                              <p:pRg st="6" end="6"/>
+                                            </p:txEl>
+                                          </p:spTgt>
+                                        </p:tgtEl>
+                                        <p:attrNameLst>
+                                          <p:attrName>style.visibility</p:attrName>
+                                        </p:attrNameLst>
+                                      </p:cBhvr>
+                                      <p:to>
+                                        <p:strVal val="visible"/>
+                                      </p:to>
+                                    </p:set>
+                                  </p:childTnLst>
+                                </p:cTn>
+                              </p:par>
+                            </p:childTnLst>
+                          </p:cTn>
+                        </p:par>
+                      </p:childTnLst>
+                    </p:cTn>
+                  </p:par>
+                  <p:par>
+                    <p:cTn id="27" fill="hold">
+                      <p:stCondLst>
+                        <p:cond delay="indefinite"/>
+                      </p:stCondLst>
+                      <p:childTnLst>
+                        <p:par>
+                          <p:cTn id="28" fill="hold">
+                            <p:stCondLst>
+                              <p:cond delay="0"/>
+                            </p:stCondLst>
+                            <p:childTnLst>
+                              <p:par>
+                                <p:cTn id="29" presetID="1" presetClass="entr" presetSubtype="0" fill="hold" nodeType="clickEffect">
+                                  <p:stCondLst>
+                                    <p:cond delay="0"/>
+                                  </p:stCondLst>
+                                  <p:childTnLst>
+                                    <p:set>
+                                      <p:cBhvr>
+                                        <p:cTn id="30" dur="1" fill="hold">
+                                          <p:stCondLst>
+                                            <p:cond delay="0"/>
+                                          </p:stCondLst>
+                                        </p:cTn>
+                                        <p:tgtEl>
+                                          <p:spTgt spid="3">
+                                            <p:txEl>
+                                              <p:pRg st="7" end="7"/>
+                                            </p:txEl>
+                                          </p:spTgt>
+                                        </p:tgtEl>
+                                        <p:attrNameLst>
+                                          <p:attrName>style.visibility</p:attrName>
+                                        </p:attrNameLst>
+                                      </p:cBhvr>
+                                      <p:to>
+                                        <p:strVal val="visible"/>
+                                      </p:to>
+                                    </p:set>
+                                  </p:childTnLst>
+                                </p:cTn>
+                              </p:par>
+                            </p:childTnLst>
+                          </p:cTn>
+                        </p:par>
+                      </p:childTnLst>
+                    </p:cTn>
+                  </p:par>
+                </p:childTnLst>
+              </p:cTn>
+              <p:prevCondLst>
+                <p:cond evt="onPrev" delay="0">
+                  <p:tgtEl>
+                    <p:sldTgt/>
+                  </p:tgtEl>
+                </p:cond>
+              </p:prevCondLst>
+              <p:nextCondLst>
+                <p:cond evt="onNext" delay="0">
+                  <p:tgtEl>
+                    <p:sldTgt/>
+                  </p:tgtEl>
+                </p:cond>
+              </p:nextCondLst>
+            </p:seq>
+          </p:childTnLst>
+        </p:cTn>
+      </p:par>
+    </p:tnLst>
+  </p:timing>
+</p:sld>
+</file>
+
+<file path=ppt/slides/slide5.xml><?xml version="1.0" encoding="utf-8"?>
+<p:sld xmlns:a="http://schemas.openxmlformats.org/drawingml/2006/main" xmlns:r="http://schemas.openxmlformats.org/officeDocument/2006/relationships" xmlns:p="http://schemas.openxmlformats.org/presentationml/2006/main">
+  <p:cSld>
+    <p:spTree>
+      <p:nvGrpSpPr>
+        <p:cNvPr id="1" name=""/>
+        <p:cNvGrpSpPr/>
+        <p:nvPr/>
+      </p:nvGrpSpPr>
+      <p:grpSpPr>
+        <a:xfrm>
+          <a:off x="0" y="0"/>
+          <a:ext cx="0" cy="0"/>
+          <a:chOff x="0" y="0"/>
+          <a:chExt cx="0" cy="0"/>
+        </a:xfrm>
+      </p:grpSpPr>
+      <p:sp>
+        <p:nvSpPr>
+          <p:cNvPr id="2" name="Title 1"/>
+          <p:cNvSpPr>
+            <a:spLocks noGrp="1"/>
+          </p:cNvSpPr>
+          <p:nvPr>
+            <p:ph type="title"/>
+          </p:nvPr>
+        </p:nvSpPr>
+        <p:spPr/>
+        <p:txBody>
+          <a:bodyPr/>
+          <a:lstStyle/>
+          <a:p>
+            <a:r>
+              <a:rPr lang="en-US" dirty="0" smtClean="0"/>
+              <a:t>Rise of our machines</a:t>
+            </a:r>
+            <a:endParaRPr lang="en-US" dirty="0"/>
+          </a:p>
+        </p:txBody>
+      </p:sp>
+      <p:sp>
+        <p:nvSpPr>
+          <p:cNvPr id="3" name="Content Placeholder 2"/>
+          <p:cNvSpPr>
+            <a:spLocks noGrp="1"/>
+          </p:cNvSpPr>
+          <p:nvPr>
+            <p:ph idx="1"/>
+          </p:nvPr>
+        </p:nvSpPr>
+        <p:spPr/>
+        <p:txBody>
+          <a:bodyPr>
+            <a:normAutofit/>
+          </a:bodyPr>
+          <a:lstStyle/>
+          <a:p>
+            <a:r>
+              <a:rPr lang="en-US" dirty="0" err="1" smtClean="0"/>
+              <a:t>Arduino</a:t>
+            </a:r>
+            <a:r>
+              <a:rPr lang="en-US" dirty="0" smtClean="0"/>
+              <a:t> – 2005</a:t>
+            </a:r>
+          </a:p>
+          <a:p>
+            <a:r>
+              <a:rPr lang="en-US" dirty="0" smtClean="0"/>
+              <a:t>Google V8 - 2008</a:t>
+            </a:r>
+          </a:p>
+          <a:p>
+            <a:r>
+              <a:rPr lang="en-US" dirty="0" err="1" smtClean="0"/>
+              <a:t>NodeJS</a:t>
+            </a:r>
+            <a:r>
+              <a:rPr lang="en-US" dirty="0" smtClean="0"/>
+              <a:t> -  2009</a:t>
+            </a:r>
+          </a:p>
+          <a:p>
+            <a:r>
+              <a:rPr lang="en-US" dirty="0" smtClean="0"/>
+              <a:t>Raspberry Pi Foundation – 2009</a:t>
+            </a:r>
+          </a:p>
+          <a:p>
+            <a:r>
+              <a:rPr lang="en-US" dirty="0" smtClean="0"/>
+              <a:t>Node </a:t>
+            </a:r>
+            <a:r>
+              <a:rPr lang="en-US" dirty="0" err="1" smtClean="0"/>
+              <a:t>Serialport</a:t>
+            </a:r>
+            <a:r>
+              <a:rPr lang="en-US" dirty="0" smtClean="0"/>
+              <a:t> – 2011</a:t>
+            </a:r>
+          </a:p>
+          <a:p>
+            <a:r>
+              <a:rPr lang="en-US" dirty="0" smtClean="0"/>
+              <a:t>Johnny-five - 2012</a:t>
+            </a:r>
+          </a:p>
+        </p:txBody>
+      </p:sp>
+    </p:spTree>
+    <p:extLst>
+      <p:ext uri="{BB962C8B-B14F-4D97-AF65-F5344CB8AC3E}">
+        <p14:creationId xmlns:p14="http://schemas.microsoft.com/office/powerpoint/2010/main" val="1401749450"/>
+      </p:ext>
+    </p:extLst>
+  </p:cSld>
+  <p:clrMapOvr>
+    <a:masterClrMapping/>
+  </p:clrMapOvr>
+  <p:timing>
+    <p:tnLst>
+      <p:par>
+        <p:cTn xmlns:p14="http://schemas.microsoft.com/office/powerpoint/2010/main" id="1" dur="indefinite" restart="never" nodeType="tmRoot">
+          <p:childTnLst>
+            <p:seq concurrent="1" nextAc="seek">
+              <p:cTn id="2" dur="indefinite" nodeType="mainSeq">
+                <p:childTnLst>
+                  <p:par>
+                    <p:cTn id="3" fill="hold">
+                      <p:stCondLst>
+                        <p:cond delay="indefinite"/>
+                      </p:stCondLst>
+                      <p:childTnLst>
+                        <p:par>
+                          <p:cTn id="4" fill="hold">
+                            <p:stCondLst>
+                              <p:cond delay="0"/>
+                            </p:stCondLst>
+                            <p:childTnLst>
+                              <p:par>
+                                <p:cTn id="5" presetID="1" presetClass="entr" presetSubtype="0" fill="hold" nodeType="clickEffect">
+                                  <p:stCondLst>
+                                    <p:cond delay="0"/>
+                                  </p:stCondLst>
+                                  <p:childTnLst>
+                                    <p:set>
+                                      <p:cBhvr>
+                                        <p:cTn id="6" dur="1" fill="hold">
+                                          <p:stCondLst>
+                                            <p:cond delay="0"/>
+                                          </p:stCondLst>
+                                        </p:cTn>
+                                        <p:tgtEl>
+                                          <p:spTgt spid="3">
+                                            <p:txEl>
+                                              <p:pRg st="0" end="0"/>
+                                            </p:txEl>
+                                          </p:spTgt>
+                                        </p:tgtEl>
+                                        <p:attrNameLst>
+                                          <p:attrName>style.visibility</p:attrName>
+                                        </p:attrNameLst>
+                                      </p:cBhvr>
+                                      <p:to>
+                                        <p:strVal val="visible"/>
+                                      </p:to>
+                                    </p:set>
+                                  </p:childTnLst>
+                                </p:cTn>
+                              </p:par>
+                            </p:childTnLst>
+                          </p:cTn>
+                        </p:par>
+                      </p:childTnLst>
+                    </p:cTn>
+                  </p:par>
+                  <p:par>
+                    <p:cTn id="7" fill="hold">
+                      <p:stCondLst>
+                        <p:cond delay="indefinite"/>
+                      </p:stCondLst>
+                      <p:childTnLst>
+                        <p:par>
+                          <p:cTn id="8" fill="hold">
+                            <p:stCondLst>
+                              <p:cond delay="0"/>
+                            </p:stCondLst>
+                            <p:childTnLst>
+                              <p:par>
+                                <p:cTn id="9" presetID="1" presetClass="entr" presetSubtype="0" fill="hold" nodeType="clickEffect">
+                                  <p:stCondLst>
+                                    <p:cond delay="0"/>
+                                  </p:stCondLst>
+                                  <p:childTnLst>
+                                    <p:set>
+                                      <p:cBhvr>
+                                        <p:cTn id="10" dur="1" fill="hold">
+                                          <p:stCondLst>
+                                            <p:cond delay="0"/>
+                                          </p:stCondLst>
+                                        </p:cTn>
+                                        <p:tgtEl>
+                                          <p:spTgt spid="3">
+                                            <p:txEl>
+                                              <p:pRg st="1" end="1"/>
+                                            </p:txEl>
+                                          </p:spTgt>
+                                        </p:tgtEl>
+                                        <p:attrNameLst>
+                                          <p:attrName>style.visibility</p:attrName>
+                                        </p:attrNameLst>
+                                      </p:cBhvr>
+                                      <p:to>
+                                        <p:strVal val="visible"/>
+                                      </p:to>
+                                    </p:set>
+                                  </p:childTnLst>
+                                </p:cTn>
+                              </p:par>
+                            </p:childTnLst>
+                          </p:cTn>
+                        </p:par>
+                      </p:childTnLst>
+                    </p:cTn>
+                  </p:par>
+                  <p:par>
+                    <p:cTn id="11" fill="hold">
+                      <p:stCondLst>
+                        <p:cond delay="indefinite"/>
+                      </p:stCondLst>
+                      <p:childTnLst>
+                        <p:par>
+                          <p:cTn id="12" fill="hold">
+                            <p:stCondLst>
+                              <p:cond delay="0"/>
+                            </p:stCondLst>
+                            <p:childTnLst>
+                              <p:par>
+                                <p:cTn id="13" presetID="1" presetClass="entr" presetSubtype="0" fill="hold" nodeType="clickEffect">
+                                  <p:stCondLst>
+                                    <p:cond delay="0"/>
+                                  </p:stCondLst>
+                                  <p:childTnLst>
+                                    <p:set>
+                                      <p:cBhvr>
+                                        <p:cTn id="14" dur="1" fill="hold">
+                                          <p:stCondLst>
+                                            <p:cond delay="0"/>
+                                          </p:stCondLst>
+                                        </p:cTn>
+                                        <p:tgtEl>
+                                          <p:spTgt spid="3">
+                                            <p:txEl>
+                                              <p:pRg st="2" end="2"/>
+                                            </p:txEl>
+                                          </p:spTgt>
+                                        </p:tgtEl>
+                                        <p:attrNameLst>
+                                          <p:attrName>style.visibility</p:attrName>
+                                        </p:attrNameLst>
+                                      </p:cBhvr>
+                                      <p:to>
+                                        <p:strVal val="visible"/>
+                                      </p:to>
+                                    </p:set>
+                                  </p:childTnLst>
+                                </p:cTn>
+                              </p:par>
+                            </p:childTnLst>
+                          </p:cTn>
+                        </p:par>
+                      </p:childTnLst>
+                    </p:cTn>
+                  </p:par>
+                  <p:par>
+                    <p:cTn id="15" fill="hold">
+                      <p:stCondLst>
+                        <p:cond delay="indefinite"/>
+                      </p:stCondLst>
+                      <p:childTnLst>
+                        <p:par>
+                          <p:cTn id="16" fill="hold">
+                            <p:stCondLst>
+                              <p:cond delay="0"/>
+                            </p:stCondLst>
+                            <p:childTnLst>
+                              <p:par>
+                                <p:cTn id="17" presetID="1" presetClass="entr" presetSubtype="0" fill="hold" nodeType="clickEffect">
+                                  <p:stCondLst>
+                                    <p:cond delay="0"/>
+                                  </p:stCondLst>
+                                  <p:childTnLst>
+                                    <p:set>
+                                      <p:cBhvr>
+                                        <p:cTn id="18" dur="1" fill="hold">
+                                          <p:stCondLst>
+                                            <p:cond delay="0"/>
+                                          </p:stCondLst>
+                                        </p:cTn>
+                                        <p:tgtEl>
+                                          <p:spTgt spid="3">
+                                            <p:txEl>
+                                              <p:pRg st="3" end="3"/>
+                                            </p:txEl>
+                                          </p:spTgt>
+                                        </p:tgtEl>
+                                        <p:attrNameLst>
+                                          <p:attrName>style.visibility</p:attrName>
+                                        </p:attrNameLst>
+                                      </p:cBhvr>
+                                      <p:to>
+                                        <p:strVal val="visible"/>
+                                      </p:to>
+                                    </p:set>
+                                  </p:childTnLst>
+                                </p:cTn>
+                              </p:par>
+                            </p:childTnLst>
+                          </p:cTn>
+                        </p:par>
+                      </p:childTnLst>
+                    </p:cTn>
+                  </p:par>
+                  <p:par>
+                    <p:cTn id="19" fill="hold">
+                      <p:stCondLst>
+                        <p:cond delay="indefinite"/>
+                      </p:stCondLst>
+                      <p:childTnLst>
+                        <p:par>
+                          <p:cTn id="20" fill="hold">
+                            <p:stCondLst>
+                              <p:cond delay="0"/>
+                            </p:stCondLst>
+                            <p:childTnLst>
+                              <p:par>
+                                <p:cTn id="21" presetID="1" presetClass="entr" presetSubtype="0" fill="hold" nodeType="clickEffect">
+                                  <p:stCondLst>
+                                    <p:cond delay="0"/>
+                                  </p:stCondLst>
+                                  <p:childTnLst>
+                                    <p:set>
+                                      <p:cBhvr>
+                                        <p:cTn id="22" dur="1" fill="hold">
+                                          <p:stCondLst>
+                                            <p:cond delay="0"/>
+                                          </p:stCondLst>
+                                        </p:cTn>
+                                        <p:tgtEl>
+                                          <p:spTgt spid="3">
+                                            <p:txEl>
+                                              <p:pRg st="4" end="4"/>
+                                            </p:txEl>
+                                          </p:spTgt>
+                                        </p:tgtEl>
+                                        <p:attrNameLst>
+                                          <p:attrName>style.visibility</p:attrName>
+                                        </p:attrNameLst>
+                                      </p:cBhvr>
+                                      <p:to>
+                                        <p:strVal val="visible"/>
+                                      </p:to>
+                                    </p:set>
+                                  </p:childTnLst>
+                                </p:cTn>
+                              </p:par>
+                            </p:childTnLst>
+                          </p:cTn>
+                        </p:par>
+                      </p:childTnLst>
+                    </p:cTn>
+                  </p:par>
+                  <p:par>
+                    <p:cTn id="23" fill="hold">
+                      <p:stCondLst>
+                        <p:cond delay="indefinite"/>
+                      </p:stCondLst>
+                      <p:childTnLst>
+                        <p:par>
+                          <p:cTn id="24" fill="hold">
+                            <p:stCondLst>
+                              <p:cond delay="0"/>
+                            </p:stCondLst>
+                            <p:childTnLst>
+                              <p:par>
+                                <p:cTn id="25" presetID="1" presetClass="entr" presetSubtype="0" fill="hold" nodeType="clickEffect">
+                                  <p:stCondLst>
+                                    <p:cond delay="0"/>
+                                  </p:stCondLst>
+                                  <p:childTnLst>
+                                    <p:set>
+                                      <p:cBhvr>
+                                        <p:cTn id="26" dur="1" fill="hold">
+                                          <p:stCondLst>
+                                            <p:cond delay="0"/>
+                                          </p:stCondLst>
+                                        </p:cTn>
+                                        <p:tgtEl>
+                                          <p:spTgt spid="3">
+                                            <p:txEl>
+                                              <p:pRg st="5" end="5"/>
+                                            </p:txEl>
+                                          </p:spTgt>
+                                        </p:tgtEl>
+                                        <p:attrNameLst>
+                                          <p:attrName>style.visibility</p:attrName>
+                                        </p:attrNameLst>
+                                      </p:cBhvr>
+                                      <p:to>
+                                        <p:strVal val="visible"/>
+                                      </p:to>
+                                    </p:set>
+                                  </p:childTnLst>
+                                </p:cTn>
+                              </p:par>
+                            </p:childTnLst>
+                          </p:cTn>
+                        </p:par>
+                      </p:childTnLst>
+                    </p:cTn>
+                  </p:par>
+                </p:childTnLst>
+              </p:cTn>
+              <p:prevCondLst>
+                <p:cond evt="onPrev" delay="0">
+                  <p:tgtEl>
+                    <p:sldTgt/>
+                  </p:tgtEl>
+                </p:cond>
+              </p:prevCondLst>
+              <p:nextCondLst>
+                <p:cond evt="onNext" delay="0">
+                  <p:tgtEl>
+                    <p:sldTgt/>
+                  </p:tgtEl>
+                </p:cond>
+              </p:nextCondLst>
+            </p:seq>
+          </p:childTnLst>
+        </p:cTn>
+      </p:par>
+    </p:tnLst>
+  </p:timing>
+</p:sld>
+</file>
+
+<file path=ppt/slides/slide6.xml><?xml version="1.0" encoding="utf-8"?>
+<p:sld xmlns:a="http://schemas.openxmlformats.org/drawingml/2006/main" xmlns:r="http://schemas.openxmlformats.org/officeDocument/2006/relationships" xmlns:p="http://schemas.openxmlformats.org/presentationml/2006/main">
+  <p:cSld>
+    <p:spTree>
+      <p:nvGrpSpPr>
+        <p:cNvPr id="1" name=""/>
+        <p:cNvGrpSpPr/>
+        <p:nvPr/>
+      </p:nvGrpSpPr>
+      <p:grpSpPr>
+        <a:xfrm>
+          <a:off x="0" y="0"/>
+          <a:ext cx="0" cy="0"/>
+          <a:chOff x="0" y="0"/>
+          <a:chExt cx="0" cy="0"/>
+        </a:xfrm>
+      </p:grpSpPr>
+      <p:sp>
+        <p:nvSpPr>
+          <p:cNvPr id="2" name="Title 1"/>
+          <p:cNvSpPr>
+            <a:spLocks noGrp="1"/>
+          </p:cNvSpPr>
+          <p:nvPr>
+            <p:ph type="title"/>
+          </p:nvPr>
+        </p:nvSpPr>
+        <p:spPr/>
+        <p:txBody>
+          <a:bodyPr/>
+          <a:lstStyle/>
+          <a:p>
+            <a:r>
+              <a:rPr lang="en-US" dirty="0" smtClean="0"/>
+              <a:t>Atwood’s Law</a:t>
+            </a:r>
+            <a:endParaRPr lang="en-US" dirty="0"/>
+          </a:p>
+        </p:txBody>
+      </p:sp>
+      <p:sp>
+        <p:nvSpPr>
+          <p:cNvPr id="3" name="Content Placeholder 2"/>
+          <p:cNvSpPr>
+            <a:spLocks noGrp="1"/>
+          </p:cNvSpPr>
+          <p:nvPr>
+            <p:ph idx="1"/>
+          </p:nvPr>
+        </p:nvSpPr>
+        <p:spPr>
+          <a:xfrm>
+            <a:off x="749098" y="2978254"/>
+            <a:ext cx="7670776" cy="2483794"/>
+          </a:xfrm>
+        </p:spPr>
+        <p:txBody>
+          <a:bodyPr/>
+          <a:lstStyle/>
+          <a:p>
+            <a:pPr marL="349250" lvl="1" indent="0">
+              <a:buNone/>
+            </a:pPr>
+            <a:r>
+              <a:rPr lang="en-US" sz="3200" dirty="0"/>
+              <a:t>Any application that can be written in JavaScript, will eventually be written in JavaScript</a:t>
+            </a:r>
+            <a:r>
+              <a:rPr lang="en-US" sz="3200" dirty="0" smtClean="0"/>
+              <a:t>.</a:t>
+            </a:r>
+          </a:p>
+          <a:p>
+            <a:pPr marL="349250" lvl="1" indent="0" algn="r">
+              <a:buNone/>
+            </a:pPr>
+            <a:r>
+              <a:rPr lang="en-US" dirty="0" smtClean="0"/>
+              <a:t> </a:t>
+            </a:r>
+            <a:r>
+              <a:rPr lang="en-US" dirty="0"/>
+              <a:t>– Jeff Atwood, July 17, 2007</a:t>
+            </a:r>
+          </a:p>
+          <a:p>
+            <a:pPr marL="349250" lvl="1" indent="0">
+              <a:buNone/>
+            </a:pPr>
+            <a:endParaRPr lang="en-US" dirty="0"/>
+          </a:p>
+        </p:txBody>
+      </p:sp>
+    </p:spTree>
+    <p:extLst>
+      <p:ext uri="{BB962C8B-B14F-4D97-AF65-F5344CB8AC3E}">
+        <p14:creationId xmlns:p14="http://schemas.microsoft.com/office/powerpoint/2010/main" val="3561602577"/>
+      </p:ext>
+    </p:extLst>
+  </p:cSld>
+  <p:clrMapOvr>
+    <a:masterClrMapping/>
+  </p:clrMapOvr>
+  <p:timing>
+    <p:tnLst>
+      <p:par>
+        <p:cTn xmlns:p14="http://schemas.microsoft.com/office/powerpoint/2010/main" id="1" dur="indefinite" restart="never" nodeType="tmRoot"/>
+      </p:par>
+    </p:tnLst>
+  </p:timing>
+</p:sld>
+</file>
+
+<file path=ppt/slides/slide7.xml><?xml version="1.0" encoding="utf-8"?>
+<p:sld xmlns:a="http://schemas.openxmlformats.org/drawingml/2006/main" xmlns:r="http://schemas.openxmlformats.org/officeDocument/2006/relationships" xmlns:p="http://schemas.openxmlformats.org/presentationml/2006/main">
+  <p:cSld>
+    <p:spTree>
+      <p:nvGrpSpPr>
+        <p:cNvPr id="1" name=""/>
+        <p:cNvGrpSpPr/>
+        <p:nvPr/>
+      </p:nvGrpSpPr>
+      <p:grpSpPr>
+        <a:xfrm>
+          <a:off x="0" y="0"/>
+          <a:ext cx="0" cy="0"/>
+          <a:chOff x="0" y="0"/>
+          <a:chExt cx="0" cy="0"/>
+        </a:xfrm>
+      </p:grpSpPr>
+      <p:sp>
+        <p:nvSpPr>
+          <p:cNvPr id="2" name="Title 1"/>
+          <p:cNvSpPr>
+            <a:spLocks noGrp="1"/>
+          </p:cNvSpPr>
+          <p:nvPr>
+            <p:ph type="title"/>
+          </p:nvPr>
+        </p:nvSpPr>
+        <p:spPr/>
+        <p:txBody>
+          <a:bodyPr/>
+          <a:lstStyle/>
+          <a:p>
+            <a:r>
+              <a:rPr lang="en-US" dirty="0" smtClean="0"/>
+              <a:t>Native JavaScript machines	</a:t>
+            </a:r>
+            <a:endParaRPr lang="en-US" dirty="0"/>
+          </a:p>
+        </p:txBody>
+      </p:sp>
+      <p:sp>
+        <p:nvSpPr>
+          <p:cNvPr id="3" name="Content Placeholder 2"/>
+          <p:cNvSpPr>
+            <a:spLocks noGrp="1"/>
+          </p:cNvSpPr>
+          <p:nvPr>
+            <p:ph idx="1"/>
+          </p:nvPr>
+        </p:nvSpPr>
+        <p:spPr/>
+        <p:txBody>
+          <a:bodyPr/>
+          <a:lstStyle/>
+          <a:p>
+            <a:r>
+              <a:rPr lang="en-US" dirty="0" err="1" smtClean="0"/>
+              <a:t>Tessel</a:t>
+            </a:r>
+            <a:r>
+              <a:rPr lang="en-US" dirty="0"/>
+              <a:t> - </a:t>
+            </a:r>
+            <a:r>
+              <a:rPr lang="en-US" dirty="0">
+                <a:hlinkClick r:id="rId3"/>
+              </a:rPr>
+              <a:t>https://tessel.io</a:t>
+            </a:r>
+            <a:r>
+              <a:rPr lang="en-US" dirty="0" smtClean="0">
+                <a:hlinkClick r:id="rId3"/>
+              </a:rPr>
+              <a:t>/</a:t>
+            </a:r>
+            <a:endParaRPr lang="en-US" dirty="0" smtClean="0"/>
+          </a:p>
+          <a:p>
+            <a:r>
+              <a:rPr lang="en-US" dirty="0" err="1" smtClean="0"/>
+              <a:t>Espruino</a:t>
+            </a:r>
+            <a:r>
+              <a:rPr lang="en-US" dirty="0"/>
+              <a:t> - </a:t>
+            </a:r>
+            <a:r>
+              <a:rPr lang="en-US" dirty="0">
+                <a:hlinkClick r:id="rId4"/>
+              </a:rPr>
+              <a:t>http://www.espruino.com</a:t>
+            </a:r>
+            <a:r>
+              <a:rPr lang="en-US" dirty="0" smtClean="0">
+                <a:hlinkClick r:id="rId4"/>
+              </a:rPr>
+              <a:t>/</a:t>
+            </a:r>
+            <a:endParaRPr lang="en-US" dirty="0" smtClean="0"/>
+          </a:p>
+          <a:p>
+            <a:pPr marL="0" indent="0">
+              <a:buNone/>
+            </a:pPr>
+            <a:endParaRPr lang="en-US" dirty="0" smtClean="0"/>
+          </a:p>
+          <a:p>
+            <a:endParaRPr lang="en-US" dirty="0"/>
+          </a:p>
+        </p:txBody>
+      </p:sp>
+    </p:spTree>
+    <p:extLst>
+      <p:ext uri="{BB962C8B-B14F-4D97-AF65-F5344CB8AC3E}">
+        <p14:creationId xmlns:p14="http://schemas.microsoft.com/office/powerpoint/2010/main" val="2584001965"/>
+      </p:ext>
+    </p:extLst>
+  </p:cSld>
+  <p:clrMapOvr>
+    <a:masterClrMapping/>
+  </p:clrMapOvr>
+  <p:timing>
+    <p:tnLst>
+      <p:par>
+        <p:cTn xmlns:p14="http://schemas.microsoft.com/office/powerpoint/2010/main" id="1" dur="indefinite" restart="never" nodeType="tmRoot">
+          <p:childTnLst>
+            <p:seq concurrent="1" nextAc="seek">
+              <p:cTn id="2" dur="indefinite" nodeType="mainSeq">
+                <p:childTnLst>
+                  <p:par>
+                    <p:cTn id="3" fill="hold">
+                      <p:stCondLst>
+                        <p:cond delay="indefinite"/>
+                      </p:stCondLst>
+                      <p:childTnLst>
+                        <p:par>
+                          <p:cTn id="4" fill="hold">
+                            <p:stCondLst>
+                              <p:cond delay="0"/>
+                            </p:stCondLst>
+                            <p:childTnLst>
+                              <p:par>
+                                <p:cTn id="5" presetID="1" presetClass="entr" presetSubtype="0" fill="hold" nodeType="clickEffect">
+                                  <p:stCondLst>
+                                    <p:cond delay="0"/>
+                                  </p:stCondLst>
+                                  <p:childTnLst>
+                                    <p:set>
+                                      <p:cBhvr>
+                                        <p:cTn id="6" dur="1" fill="hold">
+                                          <p:stCondLst>
+                                            <p:cond delay="0"/>
+                                          </p:stCondLst>
+                                        </p:cTn>
+                                        <p:tgtEl>
+                                          <p:spTgt spid="3">
+                                            <p:txEl>
+                                              <p:pRg st="0" end="0"/>
+                                            </p:txEl>
+                                          </p:spTgt>
+                                        </p:tgtEl>
+                                        <p:attrNameLst>
+                                          <p:attrName>style.visibility</p:attrName>
+                                        </p:attrNameLst>
+                                      </p:cBhvr>
+                                      <p:to>
+                                        <p:strVal val="visible"/>
+                                      </p:to>
+                                    </p:set>
+                                  </p:childTnLst>
+                                </p:cTn>
+                              </p:par>
+                            </p:childTnLst>
+                          </p:cTn>
+                        </p:par>
+                      </p:childTnLst>
+                    </p:cTn>
+                  </p:par>
+                  <p:par>
+                    <p:cTn id="7" fill="hold">
+                      <p:stCondLst>
+                        <p:cond delay="indefinite"/>
+                      </p:stCondLst>
+                      <p:childTnLst>
+                        <p:par>
+                          <p:cTn id="8" fill="hold">
+                            <p:stCondLst>
+                              <p:cond delay="0"/>
+                            </p:stCondLst>
+                            <p:childTnLst>
+                              <p:par>
+                                <p:cTn id="9" presetID="1" presetClass="entr" presetSubtype="0" fill="hold" nodeType="clickEffect">
+                                  <p:stCondLst>
+                                    <p:cond delay="0"/>
+                                  </p:stCondLst>
+                                  <p:childTnLst>
+                                    <p:set>
+                                      <p:cBhvr>
+                                        <p:cTn id="10" dur="1" fill="hold">
+                                          <p:stCondLst>
+                                            <p:cond delay="0"/>
+                                          </p:stCondLst>
+                                        </p:cTn>
+                                        <p:tgtEl>
+                                          <p:spTgt spid="3">
+                                            <p:txEl>
+                                              <p:pRg st="1" end="1"/>
+                                            </p:txEl>
+                                          </p:spTgt>
+                                        </p:tgtEl>
+                                        <p:attrNameLst>
+                                          <p:attrName>style.visibility</p:attrName>
+                                        </p:attrNameLst>
+                                      </p:cBhvr>
+                                      <p:to>
+                                        <p:strVal val="visible"/>
+                                      </p:to>
+                                    </p:set>
+                                  </p:childTnLst>
+                                </p:cTn>
+                              </p:par>
+                            </p:childTnLst>
+                          </p:cTn>
+                        </p:par>
+                      </p:childTnLst>
+                    </p:cTn>
+                  </p:par>
+                </p:childTnLst>
+              </p:cTn>
+              <p:prevCondLst>
+                <p:cond evt="onPrev" delay="0">
+                  <p:tgtEl>
+                    <p:sldTgt/>
+                  </p:tgtEl>
+                </p:cond>
+              </p:prevCondLst>
+              <p:nextCondLst>
+                <p:cond evt="onNext" delay="0">
+                  <p:tgtEl>
+                    <p:sldTgt/>
+                  </p:tgtEl>
+                </p:cond>
+              </p:nextCondLst>
+            </p:seq>
+          </p:childTnLst>
+        </p:cTn>
+      </p:par>
+    </p:tnLst>
+  </p:timing>
+</p:sld>
+</file>
+
+<file path=ppt/slides/slide8.xml><?xml version="1.0" encoding="utf-8"?>
+<p:sld xmlns:a="http://schemas.openxmlformats.org/drawingml/2006/main" xmlns:r="http://schemas.openxmlformats.org/officeDocument/2006/relationships" xmlns:p="http://schemas.openxmlformats.org/presentationml/2006/main">
+  <p:cSld>
+    <p:spTree>
+      <p:nvGrpSpPr>
+        <p:cNvPr id="1" name=""/>
+        <p:cNvGrpSpPr/>
+        <p:nvPr/>
+      </p:nvGrpSpPr>
+      <p:grpSpPr>
+        <a:xfrm>
+          <a:off x="0" y="0"/>
+          <a:ext cx="0" cy="0"/>
+          <a:chOff x="0" y="0"/>
+          <a:chExt cx="0" cy="0"/>
+        </a:xfrm>
+      </p:grpSpPr>
+      <p:sp>
+        <p:nvSpPr>
+          <p:cNvPr id="2" name="Title 1"/>
+          <p:cNvSpPr>
+            <a:spLocks noGrp="1"/>
+          </p:cNvSpPr>
+          <p:nvPr>
+            <p:ph type="title"/>
+          </p:nvPr>
+        </p:nvSpPr>
+        <p:spPr/>
+        <p:txBody>
+          <a:bodyPr/>
+          <a:lstStyle/>
+          <a:p>
+            <a:r>
+              <a:rPr lang="en-US" dirty="0" smtClean="0"/>
+              <a:t>Pitfalls</a:t>
+            </a:r>
+            <a:endParaRPr lang="en-US" dirty="0"/>
+          </a:p>
+        </p:txBody>
+      </p:sp>
+      <p:sp>
+        <p:nvSpPr>
+          <p:cNvPr id="3" name="Content Placeholder 2"/>
+          <p:cNvSpPr>
+            <a:spLocks noGrp="1"/>
+          </p:cNvSpPr>
+          <p:nvPr>
+            <p:ph idx="1"/>
+          </p:nvPr>
+        </p:nvSpPr>
+        <p:spPr/>
+        <p:txBody>
+          <a:bodyPr>
+            <a:normAutofit fontScale="85000" lnSpcReduction="20000"/>
+          </a:bodyPr>
+          <a:lstStyle/>
+          <a:p>
+            <a:r>
+              <a:rPr lang="en-US" dirty="0" smtClean="0"/>
+              <a:t>Documentation can be spotty</a:t>
+            </a:r>
+          </a:p>
+          <a:p>
+            <a:r>
+              <a:rPr lang="en-US" dirty="0" smtClean="0"/>
+              <a:t>What to buy</a:t>
+            </a:r>
+          </a:p>
+          <a:p>
+            <a:r>
+              <a:rPr lang="en-US" dirty="0" smtClean="0"/>
+              <a:t>Instructions or parts list are a luxury</a:t>
+            </a:r>
+          </a:p>
+          <a:p>
+            <a:r>
+              <a:rPr lang="en-US" dirty="0" smtClean="0"/>
+              <a:t>Libraries and modules change names</a:t>
+            </a:r>
+          </a:p>
+          <a:p>
+            <a:r>
+              <a:rPr lang="en-US" dirty="0" smtClean="0"/>
+              <a:t>Hidden requirements (aka drivers)</a:t>
+            </a:r>
+          </a:p>
+          <a:p>
+            <a:r>
+              <a:rPr lang="en-US" dirty="0" err="1" smtClean="0"/>
+              <a:t>Doh</a:t>
+            </a:r>
+            <a:r>
+              <a:rPr lang="en-US" dirty="0" smtClean="0"/>
+              <a:t>! Serial port!</a:t>
+            </a:r>
+          </a:p>
+          <a:p>
+            <a:r>
+              <a:rPr lang="en-US" dirty="0" smtClean="0"/>
+              <a:t>Debugging hardware as well as software</a:t>
+            </a:r>
+          </a:p>
+          <a:p>
+            <a:r>
+              <a:rPr lang="en-US" dirty="0" smtClean="0"/>
+              <a:t>You make people nervous</a:t>
+            </a:r>
+          </a:p>
+          <a:p>
+            <a:endParaRPr lang="en-US" dirty="0"/>
+          </a:p>
+        </p:txBody>
+      </p:sp>
+    </p:spTree>
+    <p:extLst>
+      <p:ext uri="{BB962C8B-B14F-4D97-AF65-F5344CB8AC3E}">
+        <p14:creationId xmlns:p14="http://schemas.microsoft.com/office/powerpoint/2010/main" val="824479829"/>
       </p:ext>
     </p:extLst>
   </p:cSld>
@@ -8804,823 +10356,6 @@
             </p:seq>
           </p:childTnLst>
         </p:cTn>
-      </p:par>
-    </p:tnLst>
-  </p:timing>
-</p:sld>
-</file>
-
-<file path=ppt/slides/slide5.xml><?xml version="1.0" encoding="utf-8"?>
-<p:sld xmlns:a="http://schemas.openxmlformats.org/drawingml/2006/main" xmlns:r="http://schemas.openxmlformats.org/officeDocument/2006/relationships" xmlns:p="http://schemas.openxmlformats.org/presentationml/2006/main">
-  <p:cSld>
-    <p:spTree>
-      <p:nvGrpSpPr>
-        <p:cNvPr id="1" name=""/>
-        <p:cNvGrpSpPr/>
-        <p:nvPr/>
-      </p:nvGrpSpPr>
-      <p:grpSpPr>
-        <a:xfrm>
-          <a:off x="0" y="0"/>
-          <a:ext cx="0" cy="0"/>
-          <a:chOff x="0" y="0"/>
-          <a:chExt cx="0" cy="0"/>
-        </a:xfrm>
-      </p:grpSpPr>
-      <p:sp>
-        <p:nvSpPr>
-          <p:cNvPr id="2" name="Title 1"/>
-          <p:cNvSpPr>
-            <a:spLocks noGrp="1"/>
-          </p:cNvSpPr>
-          <p:nvPr>
-            <p:ph type="title"/>
-          </p:nvPr>
-        </p:nvSpPr>
-        <p:spPr/>
-        <p:txBody>
-          <a:bodyPr/>
-          <a:lstStyle/>
-          <a:p>
-            <a:r>
-              <a:rPr lang="en-US" dirty="0" smtClean="0"/>
-              <a:t>Rise of our machines</a:t>
-            </a:r>
-            <a:endParaRPr lang="en-US" dirty="0"/>
-          </a:p>
-        </p:txBody>
-      </p:sp>
-      <p:sp>
-        <p:nvSpPr>
-          <p:cNvPr id="3" name="Content Placeholder 2"/>
-          <p:cNvSpPr>
-            <a:spLocks noGrp="1"/>
-          </p:cNvSpPr>
-          <p:nvPr>
-            <p:ph idx="1"/>
-          </p:nvPr>
-        </p:nvSpPr>
-        <p:spPr/>
-        <p:txBody>
-          <a:bodyPr>
-            <a:normAutofit/>
-          </a:bodyPr>
-          <a:lstStyle/>
-          <a:p>
-            <a:r>
-              <a:rPr lang="en-US" dirty="0" err="1" smtClean="0"/>
-              <a:t>Arduino</a:t>
-            </a:r>
-            <a:r>
-              <a:rPr lang="en-US" dirty="0" smtClean="0"/>
-              <a:t> – 2005</a:t>
-            </a:r>
-          </a:p>
-          <a:p>
-            <a:r>
-              <a:rPr lang="en-US" dirty="0" smtClean="0"/>
-              <a:t>Google V8 - 2008</a:t>
-            </a:r>
-          </a:p>
-          <a:p>
-            <a:r>
-              <a:rPr lang="en-US" dirty="0" err="1" smtClean="0"/>
-              <a:t>NodeJS</a:t>
-            </a:r>
-            <a:r>
-              <a:rPr lang="en-US" dirty="0" smtClean="0"/>
-              <a:t> -  2009</a:t>
-            </a:r>
-          </a:p>
-          <a:p>
-            <a:r>
-              <a:rPr lang="en-US" dirty="0" smtClean="0"/>
-              <a:t>Raspberry Pi Foundation – 2009</a:t>
-            </a:r>
-          </a:p>
-          <a:p>
-            <a:r>
-              <a:rPr lang="en-US" dirty="0" smtClean="0"/>
-              <a:t>Node </a:t>
-            </a:r>
-            <a:r>
-              <a:rPr lang="en-US" dirty="0" err="1" smtClean="0"/>
-              <a:t>Serialport</a:t>
-            </a:r>
-            <a:r>
-              <a:rPr lang="en-US" dirty="0" smtClean="0"/>
-              <a:t> – 2011</a:t>
-            </a:r>
-          </a:p>
-          <a:p>
-            <a:r>
-              <a:rPr lang="en-US" dirty="0" smtClean="0"/>
-              <a:t>Johnny-five - 2012</a:t>
-            </a:r>
-          </a:p>
-        </p:txBody>
-      </p:sp>
-    </p:spTree>
-    <p:extLst>
-      <p:ext uri="{BB962C8B-B14F-4D97-AF65-F5344CB8AC3E}">
-        <p14:creationId xmlns:p14="http://schemas.microsoft.com/office/powerpoint/2010/main" val="1401749450"/>
-      </p:ext>
-    </p:extLst>
-  </p:cSld>
-  <p:clrMapOvr>
-    <a:masterClrMapping/>
-  </p:clrMapOvr>
-  <p:timing>
-    <p:tnLst>
-      <p:par>
-        <p:cTn xmlns:p14="http://schemas.microsoft.com/office/powerpoint/2010/main" id="1" dur="indefinite" restart="never" nodeType="tmRoot">
-          <p:childTnLst>
-            <p:seq concurrent="1" nextAc="seek">
-              <p:cTn id="2" dur="indefinite" nodeType="mainSeq">
-                <p:childTnLst>
-                  <p:par>
-                    <p:cTn id="3" fill="hold">
-                      <p:stCondLst>
-                        <p:cond delay="indefinite"/>
-                      </p:stCondLst>
-                      <p:childTnLst>
-                        <p:par>
-                          <p:cTn id="4" fill="hold">
-                            <p:stCondLst>
-                              <p:cond delay="0"/>
-                            </p:stCondLst>
-                            <p:childTnLst>
-                              <p:par>
-                                <p:cTn id="5" presetID="1" presetClass="entr" presetSubtype="0" fill="hold" nodeType="clickEffect">
-                                  <p:stCondLst>
-                                    <p:cond delay="0"/>
-                                  </p:stCondLst>
-                                  <p:childTnLst>
-                                    <p:set>
-                                      <p:cBhvr>
-                                        <p:cTn id="6" dur="1" fill="hold">
-                                          <p:stCondLst>
-                                            <p:cond delay="0"/>
-                                          </p:stCondLst>
-                                        </p:cTn>
-                                        <p:tgtEl>
-                                          <p:spTgt spid="3">
-                                            <p:txEl>
-                                              <p:pRg st="0" end="0"/>
-                                            </p:txEl>
-                                          </p:spTgt>
-                                        </p:tgtEl>
-                                        <p:attrNameLst>
-                                          <p:attrName>style.visibility</p:attrName>
-                                        </p:attrNameLst>
-                                      </p:cBhvr>
-                                      <p:to>
-                                        <p:strVal val="visible"/>
-                                      </p:to>
-                                    </p:set>
-                                  </p:childTnLst>
-                                </p:cTn>
-                              </p:par>
-                            </p:childTnLst>
-                          </p:cTn>
-                        </p:par>
-                      </p:childTnLst>
-                    </p:cTn>
-                  </p:par>
-                  <p:par>
-                    <p:cTn id="7" fill="hold">
-                      <p:stCondLst>
-                        <p:cond delay="indefinite"/>
-                      </p:stCondLst>
-                      <p:childTnLst>
-                        <p:par>
-                          <p:cTn id="8" fill="hold">
-                            <p:stCondLst>
-                              <p:cond delay="0"/>
-                            </p:stCondLst>
-                            <p:childTnLst>
-                              <p:par>
-                                <p:cTn id="9" presetID="1" presetClass="entr" presetSubtype="0" fill="hold" nodeType="clickEffect">
-                                  <p:stCondLst>
-                                    <p:cond delay="0"/>
-                                  </p:stCondLst>
-                                  <p:childTnLst>
-                                    <p:set>
-                                      <p:cBhvr>
-                                        <p:cTn id="10" dur="1" fill="hold">
-                                          <p:stCondLst>
-                                            <p:cond delay="0"/>
-                                          </p:stCondLst>
-                                        </p:cTn>
-                                        <p:tgtEl>
-                                          <p:spTgt spid="3">
-                                            <p:txEl>
-                                              <p:pRg st="1" end="1"/>
-                                            </p:txEl>
-                                          </p:spTgt>
-                                        </p:tgtEl>
-                                        <p:attrNameLst>
-                                          <p:attrName>style.visibility</p:attrName>
-                                        </p:attrNameLst>
-                                      </p:cBhvr>
-                                      <p:to>
-                                        <p:strVal val="visible"/>
-                                      </p:to>
-                                    </p:set>
-                                  </p:childTnLst>
-                                </p:cTn>
-                              </p:par>
-                            </p:childTnLst>
-                          </p:cTn>
-                        </p:par>
-                      </p:childTnLst>
-                    </p:cTn>
-                  </p:par>
-                  <p:par>
-                    <p:cTn id="11" fill="hold">
-                      <p:stCondLst>
-                        <p:cond delay="indefinite"/>
-                      </p:stCondLst>
-                      <p:childTnLst>
-                        <p:par>
-                          <p:cTn id="12" fill="hold">
-                            <p:stCondLst>
-                              <p:cond delay="0"/>
-                            </p:stCondLst>
-                            <p:childTnLst>
-                              <p:par>
-                                <p:cTn id="13" presetID="1" presetClass="entr" presetSubtype="0" fill="hold" nodeType="clickEffect">
-                                  <p:stCondLst>
-                                    <p:cond delay="0"/>
-                                  </p:stCondLst>
-                                  <p:childTnLst>
-                                    <p:set>
-                                      <p:cBhvr>
-                                        <p:cTn id="14" dur="1" fill="hold">
-                                          <p:stCondLst>
-                                            <p:cond delay="0"/>
-                                          </p:stCondLst>
-                                        </p:cTn>
-                                        <p:tgtEl>
-                                          <p:spTgt spid="3">
-                                            <p:txEl>
-                                              <p:pRg st="2" end="2"/>
-                                            </p:txEl>
-                                          </p:spTgt>
-                                        </p:tgtEl>
-                                        <p:attrNameLst>
-                                          <p:attrName>style.visibility</p:attrName>
-                                        </p:attrNameLst>
-                                      </p:cBhvr>
-                                      <p:to>
-                                        <p:strVal val="visible"/>
-                                      </p:to>
-                                    </p:set>
-                                  </p:childTnLst>
-                                </p:cTn>
-                              </p:par>
-                            </p:childTnLst>
-                          </p:cTn>
-                        </p:par>
-                      </p:childTnLst>
-                    </p:cTn>
-                  </p:par>
-                  <p:par>
-                    <p:cTn id="15" fill="hold">
-                      <p:stCondLst>
-                        <p:cond delay="indefinite"/>
-                      </p:stCondLst>
-                      <p:childTnLst>
-                        <p:par>
-                          <p:cTn id="16" fill="hold">
-                            <p:stCondLst>
-                              <p:cond delay="0"/>
-                            </p:stCondLst>
-                            <p:childTnLst>
-                              <p:par>
-                                <p:cTn id="17" presetID="1" presetClass="entr" presetSubtype="0" fill="hold" nodeType="clickEffect">
-                                  <p:stCondLst>
-                                    <p:cond delay="0"/>
-                                  </p:stCondLst>
-                                  <p:childTnLst>
-                                    <p:set>
-                                      <p:cBhvr>
-                                        <p:cTn id="18" dur="1" fill="hold">
-                                          <p:stCondLst>
-                                            <p:cond delay="0"/>
-                                          </p:stCondLst>
-                                        </p:cTn>
-                                        <p:tgtEl>
-                                          <p:spTgt spid="3">
-                                            <p:txEl>
-                                              <p:pRg st="3" end="3"/>
-                                            </p:txEl>
-                                          </p:spTgt>
-                                        </p:tgtEl>
-                                        <p:attrNameLst>
-                                          <p:attrName>style.visibility</p:attrName>
-                                        </p:attrNameLst>
-                                      </p:cBhvr>
-                                      <p:to>
-                                        <p:strVal val="visible"/>
-                                      </p:to>
-                                    </p:set>
-                                  </p:childTnLst>
-                                </p:cTn>
-                              </p:par>
-                            </p:childTnLst>
-                          </p:cTn>
-                        </p:par>
-                      </p:childTnLst>
-                    </p:cTn>
-                  </p:par>
-                  <p:par>
-                    <p:cTn id="19" fill="hold">
-                      <p:stCondLst>
-                        <p:cond delay="indefinite"/>
-                      </p:stCondLst>
-                      <p:childTnLst>
-                        <p:par>
-                          <p:cTn id="20" fill="hold">
-                            <p:stCondLst>
-                              <p:cond delay="0"/>
-                            </p:stCondLst>
-                            <p:childTnLst>
-                              <p:par>
-                                <p:cTn id="21" presetID="1" presetClass="entr" presetSubtype="0" fill="hold" nodeType="clickEffect">
-                                  <p:stCondLst>
-                                    <p:cond delay="0"/>
-                                  </p:stCondLst>
-                                  <p:childTnLst>
-                                    <p:set>
-                                      <p:cBhvr>
-                                        <p:cTn id="22" dur="1" fill="hold">
-                                          <p:stCondLst>
-                                            <p:cond delay="0"/>
-                                          </p:stCondLst>
-                                        </p:cTn>
-                                        <p:tgtEl>
-                                          <p:spTgt spid="3">
-                                            <p:txEl>
-                                              <p:pRg st="4" end="4"/>
-                                            </p:txEl>
-                                          </p:spTgt>
-                                        </p:tgtEl>
-                                        <p:attrNameLst>
-                                          <p:attrName>style.visibility</p:attrName>
-                                        </p:attrNameLst>
-                                      </p:cBhvr>
-                                      <p:to>
-                                        <p:strVal val="visible"/>
-                                      </p:to>
-                                    </p:set>
-                                  </p:childTnLst>
-                                </p:cTn>
-                              </p:par>
-                            </p:childTnLst>
-                          </p:cTn>
-                        </p:par>
-                      </p:childTnLst>
-                    </p:cTn>
-                  </p:par>
-                  <p:par>
-                    <p:cTn id="23" fill="hold">
-                      <p:stCondLst>
-                        <p:cond delay="indefinite"/>
-                      </p:stCondLst>
-                      <p:childTnLst>
-                        <p:par>
-                          <p:cTn id="24" fill="hold">
-                            <p:stCondLst>
-                              <p:cond delay="0"/>
-                            </p:stCondLst>
-                            <p:childTnLst>
-                              <p:par>
-                                <p:cTn id="25" presetID="1" presetClass="entr" presetSubtype="0" fill="hold" nodeType="clickEffect">
-                                  <p:stCondLst>
-                                    <p:cond delay="0"/>
-                                  </p:stCondLst>
-                                  <p:childTnLst>
-                                    <p:set>
-                                      <p:cBhvr>
-                                        <p:cTn id="26" dur="1" fill="hold">
-                                          <p:stCondLst>
-                                            <p:cond delay="0"/>
-                                          </p:stCondLst>
-                                        </p:cTn>
-                                        <p:tgtEl>
-                                          <p:spTgt spid="3">
-                                            <p:txEl>
-                                              <p:pRg st="5" end="5"/>
-                                            </p:txEl>
-                                          </p:spTgt>
-                                        </p:tgtEl>
-                                        <p:attrNameLst>
-                                          <p:attrName>style.visibility</p:attrName>
-                                        </p:attrNameLst>
-                                      </p:cBhvr>
-                                      <p:to>
-                                        <p:strVal val="visible"/>
-                                      </p:to>
-                                    </p:set>
-                                  </p:childTnLst>
-                                </p:cTn>
-                              </p:par>
-                            </p:childTnLst>
-                          </p:cTn>
-                        </p:par>
-                      </p:childTnLst>
-                    </p:cTn>
-                  </p:par>
-                </p:childTnLst>
-              </p:cTn>
-              <p:prevCondLst>
-                <p:cond evt="onPrev" delay="0">
-                  <p:tgtEl>
-                    <p:sldTgt/>
-                  </p:tgtEl>
-                </p:cond>
-              </p:prevCondLst>
-              <p:nextCondLst>
-                <p:cond evt="onNext" delay="0">
-                  <p:tgtEl>
-                    <p:sldTgt/>
-                  </p:tgtEl>
-                </p:cond>
-              </p:nextCondLst>
-            </p:seq>
-          </p:childTnLst>
-        </p:cTn>
-      </p:par>
-    </p:tnLst>
-  </p:timing>
-</p:sld>
-</file>
-
-<file path=ppt/slides/slide6.xml><?xml version="1.0" encoding="utf-8"?>
-<p:sld xmlns:a="http://schemas.openxmlformats.org/drawingml/2006/main" xmlns:r="http://schemas.openxmlformats.org/officeDocument/2006/relationships" xmlns:p="http://schemas.openxmlformats.org/presentationml/2006/main">
-  <p:cSld>
-    <p:spTree>
-      <p:nvGrpSpPr>
-        <p:cNvPr id="1" name=""/>
-        <p:cNvGrpSpPr/>
-        <p:nvPr/>
-      </p:nvGrpSpPr>
-      <p:grpSpPr>
-        <a:xfrm>
-          <a:off x="0" y="0"/>
-          <a:ext cx="0" cy="0"/>
-          <a:chOff x="0" y="0"/>
-          <a:chExt cx="0" cy="0"/>
-        </a:xfrm>
-      </p:grpSpPr>
-      <p:sp>
-        <p:nvSpPr>
-          <p:cNvPr id="2" name="Title 1"/>
-          <p:cNvSpPr>
-            <a:spLocks noGrp="1"/>
-          </p:cNvSpPr>
-          <p:nvPr>
-            <p:ph type="title"/>
-          </p:nvPr>
-        </p:nvSpPr>
-        <p:spPr/>
-        <p:txBody>
-          <a:bodyPr/>
-          <a:lstStyle/>
-          <a:p>
-            <a:r>
-              <a:rPr lang="en-US" dirty="0" smtClean="0"/>
-              <a:t>Atwood’s Law</a:t>
-            </a:r>
-            <a:endParaRPr lang="en-US" dirty="0"/>
-          </a:p>
-        </p:txBody>
-      </p:sp>
-      <p:sp>
-        <p:nvSpPr>
-          <p:cNvPr id="3" name="Content Placeholder 2"/>
-          <p:cNvSpPr>
-            <a:spLocks noGrp="1"/>
-          </p:cNvSpPr>
-          <p:nvPr>
-            <p:ph idx="1"/>
-          </p:nvPr>
-        </p:nvSpPr>
-        <p:spPr>
-          <a:xfrm>
-            <a:off x="749098" y="2978254"/>
-            <a:ext cx="7670776" cy="2483794"/>
-          </a:xfrm>
-        </p:spPr>
-        <p:txBody>
-          <a:bodyPr/>
-          <a:lstStyle/>
-          <a:p>
-            <a:pPr marL="349250" lvl="1" indent="0">
-              <a:buNone/>
-            </a:pPr>
-            <a:r>
-              <a:rPr lang="en-US" sz="3200" dirty="0"/>
-              <a:t>Any application that can be written in JavaScript, will eventually be written in JavaScript</a:t>
-            </a:r>
-            <a:r>
-              <a:rPr lang="en-US" sz="3200" dirty="0" smtClean="0"/>
-              <a:t>.</a:t>
-            </a:r>
-          </a:p>
-          <a:p>
-            <a:pPr marL="349250" lvl="1" indent="0" algn="r">
-              <a:buNone/>
-            </a:pPr>
-            <a:r>
-              <a:rPr lang="en-US" dirty="0" smtClean="0"/>
-              <a:t> </a:t>
-            </a:r>
-            <a:r>
-              <a:rPr lang="en-US" dirty="0"/>
-              <a:t>– Jeff Atwood, July 17, 2007</a:t>
-            </a:r>
-          </a:p>
-          <a:p>
-            <a:pPr marL="349250" lvl="1" indent="0">
-              <a:buNone/>
-            </a:pPr>
-            <a:endParaRPr lang="en-US" dirty="0"/>
-          </a:p>
-        </p:txBody>
-      </p:sp>
-    </p:spTree>
-    <p:extLst>
-      <p:ext uri="{BB962C8B-B14F-4D97-AF65-F5344CB8AC3E}">
-        <p14:creationId xmlns:p14="http://schemas.microsoft.com/office/powerpoint/2010/main" val="3561602577"/>
-      </p:ext>
-    </p:extLst>
-  </p:cSld>
-  <p:clrMapOvr>
-    <a:masterClrMapping/>
-  </p:clrMapOvr>
-  <p:timing>
-    <p:tnLst>
-      <p:par>
-        <p:cTn xmlns:p14="http://schemas.microsoft.com/office/powerpoint/2010/main" id="1" dur="indefinite" restart="never" nodeType="tmRoot"/>
-      </p:par>
-    </p:tnLst>
-  </p:timing>
-</p:sld>
-</file>
-
-<file path=ppt/slides/slide7.xml><?xml version="1.0" encoding="utf-8"?>
-<p:sld xmlns:a="http://schemas.openxmlformats.org/drawingml/2006/main" xmlns:r="http://schemas.openxmlformats.org/officeDocument/2006/relationships" xmlns:p="http://schemas.openxmlformats.org/presentationml/2006/main">
-  <p:cSld>
-    <p:spTree>
-      <p:nvGrpSpPr>
-        <p:cNvPr id="1" name=""/>
-        <p:cNvGrpSpPr/>
-        <p:nvPr/>
-      </p:nvGrpSpPr>
-      <p:grpSpPr>
-        <a:xfrm>
-          <a:off x="0" y="0"/>
-          <a:ext cx="0" cy="0"/>
-          <a:chOff x="0" y="0"/>
-          <a:chExt cx="0" cy="0"/>
-        </a:xfrm>
-      </p:grpSpPr>
-      <p:sp>
-        <p:nvSpPr>
-          <p:cNvPr id="2" name="Title 1"/>
-          <p:cNvSpPr>
-            <a:spLocks noGrp="1"/>
-          </p:cNvSpPr>
-          <p:nvPr>
-            <p:ph type="title"/>
-          </p:nvPr>
-        </p:nvSpPr>
-        <p:spPr/>
-        <p:txBody>
-          <a:bodyPr/>
-          <a:lstStyle/>
-          <a:p>
-            <a:r>
-              <a:rPr lang="en-US" dirty="0" smtClean="0"/>
-              <a:t>Native JavaScript machines	</a:t>
-            </a:r>
-            <a:endParaRPr lang="en-US" dirty="0"/>
-          </a:p>
-        </p:txBody>
-      </p:sp>
-      <p:sp>
-        <p:nvSpPr>
-          <p:cNvPr id="3" name="Content Placeholder 2"/>
-          <p:cNvSpPr>
-            <a:spLocks noGrp="1"/>
-          </p:cNvSpPr>
-          <p:nvPr>
-            <p:ph idx="1"/>
-          </p:nvPr>
-        </p:nvSpPr>
-        <p:spPr/>
-        <p:txBody>
-          <a:bodyPr/>
-          <a:lstStyle/>
-          <a:p>
-            <a:r>
-              <a:rPr lang="en-US" dirty="0" err="1" smtClean="0"/>
-              <a:t>Tessel</a:t>
-            </a:r>
-            <a:r>
-              <a:rPr lang="en-US" dirty="0"/>
-              <a:t> - </a:t>
-            </a:r>
-            <a:r>
-              <a:rPr lang="en-US" dirty="0">
-                <a:hlinkClick r:id="rId3"/>
-              </a:rPr>
-              <a:t>https://tessel.io</a:t>
-            </a:r>
-            <a:r>
-              <a:rPr lang="en-US" dirty="0" smtClean="0">
-                <a:hlinkClick r:id="rId3"/>
-              </a:rPr>
-              <a:t>/</a:t>
-            </a:r>
-            <a:endParaRPr lang="en-US" dirty="0" smtClean="0"/>
-          </a:p>
-          <a:p>
-            <a:r>
-              <a:rPr lang="en-US" dirty="0" err="1" smtClean="0"/>
-              <a:t>Espruino</a:t>
-            </a:r>
-            <a:r>
-              <a:rPr lang="en-US" dirty="0"/>
-              <a:t> - </a:t>
-            </a:r>
-            <a:r>
-              <a:rPr lang="en-US" dirty="0">
-                <a:hlinkClick r:id="rId4"/>
-              </a:rPr>
-              <a:t>http://www.espruino.com</a:t>
-            </a:r>
-            <a:r>
-              <a:rPr lang="en-US" dirty="0" smtClean="0">
-                <a:hlinkClick r:id="rId4"/>
-              </a:rPr>
-              <a:t>/</a:t>
-            </a:r>
-            <a:endParaRPr lang="en-US" dirty="0" smtClean="0"/>
-          </a:p>
-          <a:p>
-            <a:pPr marL="0" indent="0">
-              <a:buNone/>
-            </a:pPr>
-            <a:endParaRPr lang="en-US" dirty="0" smtClean="0"/>
-          </a:p>
-          <a:p>
-            <a:endParaRPr lang="en-US" dirty="0"/>
-          </a:p>
-        </p:txBody>
-      </p:sp>
-    </p:spTree>
-    <p:extLst>
-      <p:ext uri="{BB962C8B-B14F-4D97-AF65-F5344CB8AC3E}">
-        <p14:creationId xmlns:p14="http://schemas.microsoft.com/office/powerpoint/2010/main" val="2584001965"/>
-      </p:ext>
-    </p:extLst>
-  </p:cSld>
-  <p:clrMapOvr>
-    <a:masterClrMapping/>
-  </p:clrMapOvr>
-</p:sld>
-</file>
-
-<file path=ppt/slides/slide8.xml><?xml version="1.0" encoding="utf-8"?>
-<p:sld xmlns:a="http://schemas.openxmlformats.org/drawingml/2006/main" xmlns:r="http://schemas.openxmlformats.org/officeDocument/2006/relationships" xmlns:p="http://schemas.openxmlformats.org/presentationml/2006/main">
-  <p:cSld>
-    <p:spTree>
-      <p:nvGrpSpPr>
-        <p:cNvPr id="1" name=""/>
-        <p:cNvGrpSpPr/>
-        <p:nvPr/>
-      </p:nvGrpSpPr>
-      <p:grpSpPr>
-        <a:xfrm>
-          <a:off x="0" y="0"/>
-          <a:ext cx="0" cy="0"/>
-          <a:chOff x="0" y="0"/>
-          <a:chExt cx="0" cy="0"/>
-        </a:xfrm>
-      </p:grpSpPr>
-      <p:sp>
-        <p:nvSpPr>
-          <p:cNvPr id="2" name="Title 1"/>
-          <p:cNvSpPr>
-            <a:spLocks noGrp="1"/>
-          </p:cNvSpPr>
-          <p:nvPr>
-            <p:ph type="title"/>
-          </p:nvPr>
-        </p:nvSpPr>
-        <p:spPr/>
-        <p:txBody>
-          <a:bodyPr/>
-          <a:lstStyle/>
-          <a:p>
-            <a:r>
-              <a:rPr lang="en-US" dirty="0" smtClean="0"/>
-              <a:t>Pitfalls</a:t>
-            </a:r>
-            <a:endParaRPr lang="en-US" dirty="0"/>
-          </a:p>
-        </p:txBody>
-      </p:sp>
-      <p:sp>
-        <p:nvSpPr>
-          <p:cNvPr id="3" name="Content Placeholder 2"/>
-          <p:cNvSpPr>
-            <a:spLocks noGrp="1"/>
-          </p:cNvSpPr>
-          <p:nvPr>
-            <p:ph idx="1"/>
-          </p:nvPr>
-        </p:nvSpPr>
-        <p:spPr/>
-        <p:txBody>
-          <a:bodyPr>
-            <a:normAutofit fontScale="85000" lnSpcReduction="20000"/>
-          </a:bodyPr>
-          <a:lstStyle/>
-          <a:p>
-            <a:r>
-              <a:rPr lang="en-US" dirty="0" smtClean="0"/>
-              <a:t>Documentation can be spotty</a:t>
-            </a:r>
-          </a:p>
-          <a:p>
-            <a:r>
-              <a:rPr lang="en-US" dirty="0" smtClean="0"/>
-              <a:t>What to buy</a:t>
-            </a:r>
-          </a:p>
-          <a:p>
-            <a:r>
-              <a:rPr lang="en-US" dirty="0" smtClean="0"/>
-              <a:t>Instructions or parts list are a luxury</a:t>
-            </a:r>
-          </a:p>
-          <a:p>
-            <a:r>
-              <a:rPr lang="en-US" dirty="0" smtClean="0"/>
-              <a:t>Libraries and modules change names</a:t>
-            </a:r>
-          </a:p>
-          <a:p>
-            <a:r>
-              <a:rPr lang="en-US" dirty="0" smtClean="0"/>
-              <a:t>Hidden requirements (aka drivers)</a:t>
-            </a:r>
-          </a:p>
-          <a:p>
-            <a:r>
-              <a:rPr lang="en-US" dirty="0" err="1" smtClean="0"/>
-              <a:t>Doh</a:t>
-            </a:r>
-            <a:r>
-              <a:rPr lang="en-US" dirty="0" smtClean="0"/>
-              <a:t>! Serial port!</a:t>
-            </a:r>
-          </a:p>
-          <a:p>
-            <a:r>
-              <a:rPr lang="en-US" dirty="0" smtClean="0"/>
-              <a:t>Debugging hardware as well as software</a:t>
-            </a:r>
-          </a:p>
-          <a:p>
-            <a:r>
-              <a:rPr lang="en-US" dirty="0" smtClean="0"/>
-              <a:t>You make people nervous</a:t>
-            </a:r>
-          </a:p>
-          <a:p>
-            <a:endParaRPr lang="en-US" dirty="0"/>
-          </a:p>
-        </p:txBody>
-      </p:sp>
-    </p:spTree>
-    <p:extLst>
-      <p:ext uri="{BB962C8B-B14F-4D97-AF65-F5344CB8AC3E}">
-        <p14:creationId xmlns:p14="http://schemas.microsoft.com/office/powerpoint/2010/main" val="824479829"/>
-      </p:ext>
-    </p:extLst>
-  </p:cSld>
-  <p:clrMapOvr>
-    <a:masterClrMapping/>
-  </p:clrMapOvr>
-  <p:timing>
-    <p:tnLst>
-      <p:par>
-        <p:cTn xmlns:p14="http://schemas.microsoft.com/office/powerpoint/2010/main" id="1" dur="indefinite" restart="never" nodeType="tmRoot"/>
       </p:par>
     </p:tnLst>
   </p:timing>

</xml_diff>